<commit_message>
Actualizacion de diagrama de actividades
</commit_message>
<xml_diff>
--- a/PROYECTO FORMATIVO.pptx
+++ b/PROYECTO FORMATIVO.pptx
@@ -5,10 +5,10 @@
     <p:sldMasterId id="2147483648" r:id="rId1"/>
   </p:sldMasterIdLst>
   <p:notesMasterIdLst>
-    <p:notesMasterId r:id="rId33"/>
+    <p:notesMasterId r:id="rId31"/>
   </p:notesMasterIdLst>
   <p:handoutMasterIdLst>
-    <p:handoutMasterId r:id="rId34"/>
+    <p:handoutMasterId r:id="rId32"/>
   </p:handoutMasterIdLst>
   <p:sldIdLst>
     <p:sldId id="468" r:id="rId2"/>
@@ -31,17 +31,15 @@
     <p:sldId id="544" r:id="rId19"/>
     <p:sldId id="545" r:id="rId20"/>
     <p:sldId id="546" r:id="rId21"/>
-    <p:sldId id="547" r:id="rId22"/>
-    <p:sldId id="550" r:id="rId23"/>
-    <p:sldId id="548" r:id="rId24"/>
-    <p:sldId id="552" r:id="rId25"/>
-    <p:sldId id="553" r:id="rId26"/>
-    <p:sldId id="554" r:id="rId27"/>
-    <p:sldId id="555" r:id="rId28"/>
-    <p:sldId id="556" r:id="rId29"/>
-    <p:sldId id="557" r:id="rId30"/>
-    <p:sldId id="558" r:id="rId31"/>
-    <p:sldId id="264" r:id="rId32"/>
+    <p:sldId id="548" r:id="rId22"/>
+    <p:sldId id="552" r:id="rId23"/>
+    <p:sldId id="553" r:id="rId24"/>
+    <p:sldId id="554" r:id="rId25"/>
+    <p:sldId id="555" r:id="rId26"/>
+    <p:sldId id="556" r:id="rId27"/>
+    <p:sldId id="557" r:id="rId28"/>
+    <p:sldId id="558" r:id="rId29"/>
+    <p:sldId id="264" r:id="rId30"/>
   </p:sldIdLst>
   <p:sldSz cx="12192000" cy="6858000"/>
   <p:notesSz cx="6858000" cy="9144000"/>
@@ -282,7 +280,7 @@
           <a:p>
             <a:fld id="{88369B9F-131C-2846-AB8F-CEE154B4CAEB}" type="datetimeFigureOut">
               <a:rPr lang="es-CO" smtClean="0"/>
-              <a:t>5/01/2023</a:t>
+              <a:t>20/02/2023</a:t>
             </a:fld>
             <a:endParaRPr lang="es-CO"/>
           </a:p>
@@ -459,7 +457,7 @@
           <a:p>
             <a:fld id="{9660CB96-A603-FF42-AE46-F5F75F80A67B}" type="datetimeFigureOut">
               <a:rPr lang="es-CO" smtClean="0"/>
-              <a:t>5/01/2023</a:t>
+              <a:t>20/02/2023</a:t>
             </a:fld>
             <a:endParaRPr lang="es-CO"/>
           </a:p>
@@ -1044,7 +1042,7 @@
           <a:p>
             <a:fld id="{6906C58E-460D-4A4B-B0C2-1191B9D14FCB}" type="slidenum">
               <a:rPr lang="es-CO" smtClean="0"/>
-              <a:t>30</a:t>
+              <a:t>28</a:t>
             </a:fld>
             <a:endParaRPr lang="es-CO"/>
           </a:p>
@@ -1212,7 +1210,7 @@
           <a:p>
             <a:fld id="{BD986248-06F7-A441-A47A-264EBD310E11}" type="datetimeFigureOut">
               <a:rPr lang="es-CO" smtClean="0"/>
-              <a:t>5/01/2023</a:t>
+              <a:t>20/02/2023</a:t>
             </a:fld>
             <a:endParaRPr lang="es-CO"/>
           </a:p>
@@ -1412,7 +1410,7 @@
           <a:p>
             <a:fld id="{BD986248-06F7-A441-A47A-264EBD310E11}" type="datetimeFigureOut">
               <a:rPr lang="es-CO" smtClean="0"/>
-              <a:t>5/01/2023</a:t>
+              <a:t>20/02/2023</a:t>
             </a:fld>
             <a:endParaRPr lang="es-CO"/>
           </a:p>
@@ -1622,7 +1620,7 @@
           <a:p>
             <a:fld id="{BD986248-06F7-A441-A47A-264EBD310E11}" type="datetimeFigureOut">
               <a:rPr lang="es-CO" smtClean="0"/>
-              <a:t>5/01/2023</a:t>
+              <a:t>20/02/2023</a:t>
             </a:fld>
             <a:endParaRPr lang="es-CO"/>
           </a:p>
@@ -1885,7 +1883,7 @@
           <a:p>
             <a:fld id="{BD986248-06F7-A441-A47A-264EBD310E11}" type="datetimeFigureOut">
               <a:rPr lang="es-CO" smtClean="0"/>
-              <a:t>5/01/2023</a:t>
+              <a:t>20/02/2023</a:t>
             </a:fld>
             <a:endParaRPr lang="es-CO"/>
           </a:p>
@@ -2151,7 +2149,7 @@
           <a:p>
             <a:fld id="{BD986248-06F7-A441-A47A-264EBD310E11}" type="datetimeFigureOut">
               <a:rPr lang="es-CO" smtClean="0"/>
-              <a:t>5/01/2023</a:t>
+              <a:t>20/02/2023</a:t>
             </a:fld>
             <a:endParaRPr lang="es-CO"/>
           </a:p>
@@ -2427,7 +2425,7 @@
           <a:p>
             <a:fld id="{BD986248-06F7-A441-A47A-264EBD310E11}" type="datetimeFigureOut">
               <a:rPr lang="es-CO" smtClean="0"/>
-              <a:t>5/01/2023</a:t>
+              <a:t>20/02/2023</a:t>
             </a:fld>
             <a:endParaRPr lang="es-CO"/>
           </a:p>
@@ -2695,7 +2693,7 @@
           <a:p>
             <a:fld id="{BD986248-06F7-A441-A47A-264EBD310E11}" type="datetimeFigureOut">
               <a:rPr lang="es-CO" smtClean="0"/>
-              <a:t>5/01/2023</a:t>
+              <a:t>20/02/2023</a:t>
             </a:fld>
             <a:endParaRPr lang="es-CO"/>
           </a:p>
@@ -3110,7 +3108,7 @@
           <a:p>
             <a:fld id="{BD986248-06F7-A441-A47A-264EBD310E11}" type="datetimeFigureOut">
               <a:rPr lang="es-CO" smtClean="0"/>
-              <a:t>5/01/2023</a:t>
+              <a:t>20/02/2023</a:t>
             </a:fld>
             <a:endParaRPr lang="es-CO"/>
           </a:p>
@@ -3252,7 +3250,7 @@
           <a:p>
             <a:fld id="{BD986248-06F7-A441-A47A-264EBD310E11}" type="datetimeFigureOut">
               <a:rPr lang="es-CO" smtClean="0"/>
-              <a:t>5/01/2023</a:t>
+              <a:t>20/02/2023</a:t>
             </a:fld>
             <a:endParaRPr lang="es-CO"/>
           </a:p>
@@ -3365,7 +3363,7 @@
           <a:p>
             <a:fld id="{BD986248-06F7-A441-A47A-264EBD310E11}" type="datetimeFigureOut">
               <a:rPr lang="es-CO" smtClean="0"/>
-              <a:t>5/01/2023</a:t>
+              <a:t>20/02/2023</a:t>
             </a:fld>
             <a:endParaRPr lang="es-CO"/>
           </a:p>
@@ -3678,7 +3676,7 @@
           <a:p>
             <a:fld id="{BD986248-06F7-A441-A47A-264EBD310E11}" type="datetimeFigureOut">
               <a:rPr lang="es-CO" smtClean="0"/>
-              <a:t>5/01/2023</a:t>
+              <a:t>20/02/2023</a:t>
             </a:fld>
             <a:endParaRPr lang="es-CO"/>
           </a:p>
@@ -3967,7 +3965,7 @@
           <a:p>
             <a:fld id="{BD986248-06F7-A441-A47A-264EBD310E11}" type="datetimeFigureOut">
               <a:rPr lang="es-CO" smtClean="0"/>
-              <a:t>5/01/2023</a:t>
+              <a:t>20/02/2023</a:t>
             </a:fld>
             <a:endParaRPr lang="es-CO"/>
           </a:p>
@@ -4210,7 +4208,7 @@
           <a:p>
             <a:fld id="{BD986248-06F7-A441-A47A-264EBD310E11}" type="datetimeFigureOut">
               <a:rPr lang="es-CO" smtClean="0"/>
-              <a:t>5/01/2023</a:t>
+              <a:t>20/02/2023</a:t>
             </a:fld>
             <a:endParaRPr lang="es-CO"/>
           </a:p>
@@ -6583,71 +6581,12 @@
           <a:chExt cx="0" cy="0"/>
         </a:xfrm>
       </p:grpSpPr>
-      <p:sp>
-        <p:nvSpPr>
-          <p:cNvPr id="8" name="CuadroTexto 7">
-            <a:extLst>
-              <a:ext uri="{FF2B5EF4-FFF2-40B4-BE49-F238E27FC236}">
-                <a16:creationId xmlns:a16="http://schemas.microsoft.com/office/drawing/2014/main" id="{ABC283C7-C020-6BE9-CAFE-D9E18BE28B70}"/>
-              </a:ext>
-            </a:extLst>
-          </p:cNvPr>
-          <p:cNvSpPr txBox="1"/>
-          <p:nvPr/>
-        </p:nvSpPr>
-        <p:spPr>
-          <a:xfrm>
-            <a:off x="4629691" y="1194816"/>
-            <a:ext cx="7562309" cy="1569660"/>
-          </a:xfrm>
-          <a:prstGeom prst="rect">
-            <a:avLst/>
-          </a:prstGeom>
-          <a:noFill/>
-        </p:spPr>
-        <p:txBody>
-          <a:bodyPr wrap="square" rtlCol="0">
-            <a:spAutoFit/>
-          </a:bodyPr>
-          <a:lstStyle/>
-          <a:p>
-            <a:pPr algn="ctr"/>
-            <a:r>
-              <a:rPr lang="es-ES" sz="4800" dirty="0">
-                <a:solidFill>
-                  <a:schemeClr val="tx1">
-                    <a:lumMod val="75000"/>
-                    <a:lumOff val="25000"/>
-                  </a:schemeClr>
-                </a:solidFill>
-                <a:latin typeface="Work Sans" pitchFamily="2" charset="77"/>
-              </a:rPr>
-              <a:t>Diagrama de actividades</a:t>
-            </a:r>
-          </a:p>
-          <a:p>
-            <a:pPr algn="ctr"/>
-            <a:r>
-              <a:rPr lang="es-ES" sz="4800" dirty="0">
-                <a:solidFill>
-                  <a:schemeClr val="tx1">
-                    <a:lumMod val="75000"/>
-                    <a:lumOff val="25000"/>
-                  </a:schemeClr>
-                </a:solidFill>
-                <a:latin typeface="Work Sans" pitchFamily="2" charset="77"/>
-              </a:rPr>
-              <a:t>Cliente</a:t>
-            </a:r>
-          </a:p>
-        </p:txBody>
-      </p:sp>
       <p:pic>
         <p:nvPicPr>
           <p:cNvPr id="3" name="Imagen 2">
             <a:extLst>
               <a:ext uri="{FF2B5EF4-FFF2-40B4-BE49-F238E27FC236}">
-                <a16:creationId xmlns:a16="http://schemas.microsoft.com/office/drawing/2014/main" id="{A863B212-03B4-CD51-5C92-7B119C86DD0D}"/>
+                <a16:creationId xmlns:a16="http://schemas.microsoft.com/office/drawing/2014/main" id="{C19C5E03-012E-1EE7-A89C-E5B6592F85A1}"/>
               </a:ext>
             </a:extLst>
           </p:cNvPr>
@@ -6664,73 +6603,14 @@
         </p:blipFill>
         <p:spPr>
           <a:xfrm>
-            <a:off x="0" y="0"/>
-            <a:ext cx="4585999" cy="6858000"/>
+            <a:off x="573436" y="0"/>
+            <a:ext cx="10011905" cy="6858000"/>
           </a:xfrm>
           <a:prstGeom prst="rect">
             <a:avLst/>
           </a:prstGeom>
         </p:spPr>
       </p:pic>
-    </p:spTree>
-    <p:extLst>
-      <p:ext uri="{BB962C8B-B14F-4D97-AF65-F5344CB8AC3E}">
-        <p14:creationId xmlns:p14="http://schemas.microsoft.com/office/powerpoint/2010/main" val="1582320196"/>
-      </p:ext>
-    </p:extLst>
-  </p:cSld>
-  <p:clrMapOvr>
-    <a:masterClrMapping/>
-  </p:clrMapOvr>
-</p:sld>
-</file>
-
-<file path=ppt/slides/slide22.xml><?xml version="1.0" encoding="utf-8"?>
-<p:sld xmlns:a="http://schemas.openxmlformats.org/drawingml/2006/main" xmlns:r="http://schemas.openxmlformats.org/officeDocument/2006/relationships" xmlns:p="http://schemas.openxmlformats.org/presentationml/2006/main">
-  <p:cSld>
-    <p:spTree>
-      <p:nvGrpSpPr>
-        <p:cNvPr id="1" name=""/>
-        <p:cNvGrpSpPr/>
-        <p:nvPr/>
-      </p:nvGrpSpPr>
-      <p:grpSpPr>
-        <a:xfrm>
-          <a:off x="0" y="0"/>
-          <a:ext cx="0" cy="0"/>
-          <a:chOff x="0" y="0"/>
-          <a:chExt cx="0" cy="0"/>
-        </a:xfrm>
-      </p:grpSpPr>
-      <p:pic>
-        <p:nvPicPr>
-          <p:cNvPr id="3" name="Imagen 2">
-            <a:extLst>
-              <a:ext uri="{FF2B5EF4-FFF2-40B4-BE49-F238E27FC236}">
-                <a16:creationId xmlns:a16="http://schemas.microsoft.com/office/drawing/2014/main" id="{4BB43EAE-8998-0D27-2366-679E390D937C}"/>
-              </a:ext>
-            </a:extLst>
-          </p:cNvPr>
-          <p:cNvPicPr>
-            <a:picLocks noChangeAspect="1"/>
-          </p:cNvPicPr>
-          <p:nvPr/>
-        </p:nvPicPr>
-        <p:blipFill rotWithShape="1">
-          <a:blip r:embed="rId2"/>
-          <a:srcRect b="26796"/>
-          <a:stretch/>
-        </p:blipFill>
-        <p:spPr>
-          <a:xfrm>
-            <a:off x="-1" y="55944"/>
-            <a:ext cx="5413829" cy="6786878"/>
-          </a:xfrm>
-          <a:prstGeom prst="rect">
-            <a:avLst/>
-          </a:prstGeom>
-        </p:spPr>
-      </p:pic>
       <p:sp>
         <p:nvSpPr>
           <p:cNvPr id="8" name="CuadroTexto 7">
@@ -6745,8 +6625,8 @@
         </p:nvSpPr>
         <p:spPr>
           <a:xfrm>
-            <a:off x="3439885" y="55944"/>
-            <a:ext cx="7823199" cy="1569660"/>
+            <a:off x="0" y="5363860"/>
+            <a:ext cx="4129192" cy="1077218"/>
           </a:xfrm>
           <a:prstGeom prst="rect">
             <a:avLst/>
@@ -6761,7 +6641,7 @@
           <a:p>
             <a:pPr algn="ctr"/>
             <a:r>
-              <a:rPr lang="es-ES" sz="4800" dirty="0">
+              <a:rPr lang="es-ES" sz="3200" dirty="0">
                 <a:solidFill>
                   <a:schemeClr val="tx1">
                     <a:lumMod val="75000"/>
@@ -6773,142 +6653,8 @@
               <a:t>Diagrama de actividades</a:t>
             </a:r>
           </a:p>
-          <a:p>
-            <a:pPr algn="ctr"/>
-            <a:r>
-              <a:rPr lang="es-ES" sz="4800" dirty="0">
-                <a:solidFill>
-                  <a:schemeClr val="tx1">
-                    <a:lumMod val="75000"/>
-                    <a:lumOff val="25000"/>
-                  </a:schemeClr>
-                </a:solidFill>
-                <a:latin typeface="Work Sans" pitchFamily="2" charset="77"/>
-              </a:rPr>
-              <a:t>Administrador</a:t>
-            </a:r>
-          </a:p>
-        </p:txBody>
-      </p:sp>
-    </p:spTree>
-    <p:extLst>
-      <p:ext uri="{BB962C8B-B14F-4D97-AF65-F5344CB8AC3E}">
-        <p14:creationId xmlns:p14="http://schemas.microsoft.com/office/powerpoint/2010/main" val="570991276"/>
-      </p:ext>
-    </p:extLst>
-  </p:cSld>
-  <p:clrMapOvr>
-    <a:masterClrMapping/>
-  </p:clrMapOvr>
-</p:sld>
-</file>
-
-<file path=ppt/slides/slide23.xml><?xml version="1.0" encoding="utf-8"?>
-<p:sld xmlns:a="http://schemas.openxmlformats.org/drawingml/2006/main" xmlns:r="http://schemas.openxmlformats.org/officeDocument/2006/relationships" xmlns:p="http://schemas.openxmlformats.org/presentationml/2006/main">
-  <p:cSld>
-    <p:spTree>
-      <p:nvGrpSpPr>
-        <p:cNvPr id="1" name=""/>
-        <p:cNvGrpSpPr/>
-        <p:nvPr/>
-      </p:nvGrpSpPr>
-      <p:grpSpPr>
-        <a:xfrm>
-          <a:off x="0" y="0"/>
-          <a:ext cx="0" cy="0"/>
-          <a:chOff x="0" y="0"/>
-          <a:chExt cx="0" cy="0"/>
-        </a:xfrm>
-      </p:grpSpPr>
-      <p:sp>
-        <p:nvSpPr>
-          <p:cNvPr id="8" name="CuadroTexto 7">
-            <a:extLst>
-              <a:ext uri="{FF2B5EF4-FFF2-40B4-BE49-F238E27FC236}">
-                <a16:creationId xmlns:a16="http://schemas.microsoft.com/office/drawing/2014/main" id="{ABC283C7-C020-6BE9-CAFE-D9E18BE28B70}"/>
-              </a:ext>
-            </a:extLst>
-          </p:cNvPr>
-          <p:cNvSpPr txBox="1"/>
-          <p:nvPr/>
-        </p:nvSpPr>
-        <p:spPr>
-          <a:xfrm>
-            <a:off x="4441371" y="1194816"/>
-            <a:ext cx="7736115" cy="1569660"/>
-          </a:xfrm>
-          <a:prstGeom prst="rect">
-            <a:avLst/>
-          </a:prstGeom>
-          <a:noFill/>
-        </p:spPr>
-        <p:txBody>
-          <a:bodyPr wrap="square" rtlCol="0">
-            <a:spAutoFit/>
-          </a:bodyPr>
-          <a:lstStyle/>
-          <a:p>
-            <a:pPr algn="ctr"/>
-            <a:r>
-              <a:rPr lang="es-ES" sz="4800" dirty="0">
-                <a:solidFill>
-                  <a:schemeClr val="tx1">
-                    <a:lumMod val="75000"/>
-                    <a:lumOff val="25000"/>
-                  </a:schemeClr>
-                </a:solidFill>
-                <a:latin typeface="Work Sans" pitchFamily="2" charset="77"/>
-              </a:rPr>
-              <a:t>Diagrama de actividades</a:t>
-            </a:r>
-          </a:p>
-          <a:p>
-            <a:pPr algn="ctr"/>
-            <a:r>
-              <a:rPr lang="es-ES" sz="4800" dirty="0">
-                <a:solidFill>
-                  <a:schemeClr val="tx1">
-                    <a:lumMod val="75000"/>
-                    <a:lumOff val="25000"/>
-                  </a:schemeClr>
-                </a:solidFill>
-                <a:latin typeface="Work Sans" pitchFamily="2" charset="77"/>
-              </a:rPr>
-              <a:t>Prestador de servicios</a:t>
-            </a:r>
-          </a:p>
-        </p:txBody>
-      </p:sp>
-      <p:pic>
-        <p:nvPicPr>
-          <p:cNvPr id="4" name="Imagen 3">
-            <a:extLst>
-              <a:ext uri="{FF2B5EF4-FFF2-40B4-BE49-F238E27FC236}">
-                <a16:creationId xmlns:a16="http://schemas.microsoft.com/office/drawing/2014/main" id="{58B19590-974B-EE2C-5CEB-5143FEB4825C}"/>
-              </a:ext>
-            </a:extLst>
-          </p:cNvPr>
-          <p:cNvPicPr>
-            <a:picLocks noChangeAspect="1"/>
-          </p:cNvPicPr>
-          <p:nvPr/>
-        </p:nvPicPr>
-        <p:blipFill>
-          <a:blip r:embed="rId2"/>
-          <a:stretch>
-            <a:fillRect/>
-          </a:stretch>
-        </p:blipFill>
-        <p:spPr>
-          <a:xfrm>
-            <a:off x="0" y="0"/>
-            <a:ext cx="4093030" cy="6756400"/>
-          </a:xfrm>
-          <a:prstGeom prst="rect">
-            <a:avLst/>
-          </a:prstGeom>
-        </p:spPr>
-      </p:pic>
+        </p:txBody>
+      </p:sp>
     </p:spTree>
     <p:extLst>
       <p:ext uri="{BB962C8B-B14F-4D97-AF65-F5344CB8AC3E}">
@@ -6922,7 +6668,7 @@
 </p:sld>
 </file>
 
-<file path=ppt/slides/slide24.xml><?xml version="1.0" encoding="utf-8"?>
+<file path=ppt/slides/slide22.xml><?xml version="1.0" encoding="utf-8"?>
 <p:sld xmlns:a="http://schemas.openxmlformats.org/drawingml/2006/main" xmlns:r="http://schemas.openxmlformats.org/officeDocument/2006/relationships" xmlns:p="http://schemas.openxmlformats.org/presentationml/2006/main">
   <p:cSld>
     <p:spTree>
@@ -7798,6 +7544,184 @@
 </p:sld>
 </file>
 
+<file path=ppt/slides/slide23.xml><?xml version="1.0" encoding="utf-8"?>
+<p:sld xmlns:a="http://schemas.openxmlformats.org/drawingml/2006/main" xmlns:r="http://schemas.openxmlformats.org/officeDocument/2006/relationships" xmlns:p="http://schemas.openxmlformats.org/presentationml/2006/main">
+  <p:cSld>
+    <p:spTree>
+      <p:nvGrpSpPr>
+        <p:cNvPr id="1" name=""/>
+        <p:cNvGrpSpPr/>
+        <p:nvPr/>
+      </p:nvGrpSpPr>
+      <p:grpSpPr>
+        <a:xfrm>
+          <a:off x="0" y="0"/>
+          <a:ext cx="0" cy="0"/>
+          <a:chOff x="0" y="0"/>
+          <a:chExt cx="0" cy="0"/>
+        </a:xfrm>
+      </p:grpSpPr>
+      <p:sp>
+        <p:nvSpPr>
+          <p:cNvPr id="8" name="CuadroTexto 7">
+            <a:extLst>
+              <a:ext uri="{FF2B5EF4-FFF2-40B4-BE49-F238E27FC236}">
+                <a16:creationId xmlns:a16="http://schemas.microsoft.com/office/drawing/2014/main" id="{ABC283C7-C020-6BE9-CAFE-D9E18BE28B70}"/>
+              </a:ext>
+            </a:extLst>
+          </p:cNvPr>
+          <p:cNvSpPr txBox="1"/>
+          <p:nvPr/>
+        </p:nvSpPr>
+        <p:spPr>
+          <a:xfrm>
+            <a:off x="733293" y="146304"/>
+            <a:ext cx="10725414" cy="830997"/>
+          </a:xfrm>
+          <a:prstGeom prst="rect">
+            <a:avLst/>
+          </a:prstGeom>
+          <a:noFill/>
+        </p:spPr>
+        <p:txBody>
+          <a:bodyPr wrap="square" rtlCol="0">
+            <a:spAutoFit/>
+          </a:bodyPr>
+          <a:lstStyle/>
+          <a:p>
+            <a:pPr algn="ctr"/>
+            <a:r>
+              <a:rPr lang="es-ES" sz="4800" dirty="0">
+                <a:solidFill>
+                  <a:schemeClr val="tx1">
+                    <a:lumMod val="75000"/>
+                    <a:lumOff val="25000"/>
+                  </a:schemeClr>
+                </a:solidFill>
+                <a:latin typeface="Work Sans" pitchFamily="2" charset="77"/>
+              </a:rPr>
+              <a:t>Diccionario de datos</a:t>
+            </a:r>
+          </a:p>
+        </p:txBody>
+      </p:sp>
+    </p:spTree>
+    <p:extLst>
+      <p:ext uri="{BB962C8B-B14F-4D97-AF65-F5344CB8AC3E}">
+        <p14:creationId xmlns:p14="http://schemas.microsoft.com/office/powerpoint/2010/main" val="836313466"/>
+      </p:ext>
+    </p:extLst>
+  </p:cSld>
+  <p:clrMapOvr>
+    <a:masterClrMapping/>
+  </p:clrMapOvr>
+</p:sld>
+</file>
+
+<file path=ppt/slides/slide24.xml><?xml version="1.0" encoding="utf-8"?>
+<p:sld xmlns:a="http://schemas.openxmlformats.org/drawingml/2006/main" xmlns:r="http://schemas.openxmlformats.org/officeDocument/2006/relationships" xmlns:p="http://schemas.openxmlformats.org/presentationml/2006/main">
+  <p:cSld>
+    <p:spTree>
+      <p:nvGrpSpPr>
+        <p:cNvPr id="1" name=""/>
+        <p:cNvGrpSpPr/>
+        <p:nvPr/>
+      </p:nvGrpSpPr>
+      <p:grpSpPr>
+        <a:xfrm>
+          <a:off x="0" y="0"/>
+          <a:ext cx="0" cy="0"/>
+          <a:chOff x="0" y="0"/>
+          <a:chExt cx="0" cy="0"/>
+        </a:xfrm>
+      </p:grpSpPr>
+      <p:sp>
+        <p:nvSpPr>
+          <p:cNvPr id="8" name="CuadroTexto 7">
+            <a:extLst>
+              <a:ext uri="{FF2B5EF4-FFF2-40B4-BE49-F238E27FC236}">
+                <a16:creationId xmlns:a16="http://schemas.microsoft.com/office/drawing/2014/main" id="{ABC283C7-C020-6BE9-CAFE-D9E18BE28B70}"/>
+              </a:ext>
+            </a:extLst>
+          </p:cNvPr>
+          <p:cNvSpPr txBox="1"/>
+          <p:nvPr/>
+        </p:nvSpPr>
+        <p:spPr>
+          <a:xfrm>
+            <a:off x="733293" y="0"/>
+            <a:ext cx="10725414" cy="830997"/>
+          </a:xfrm>
+          <a:prstGeom prst="rect">
+            <a:avLst/>
+          </a:prstGeom>
+          <a:noFill/>
+        </p:spPr>
+        <p:txBody>
+          <a:bodyPr wrap="square" rtlCol="0">
+            <a:spAutoFit/>
+          </a:bodyPr>
+          <a:lstStyle/>
+          <a:p>
+            <a:pPr algn="ctr"/>
+            <a:r>
+              <a:rPr lang="es-ES" sz="4800" dirty="0">
+                <a:solidFill>
+                  <a:schemeClr val="tx1">
+                    <a:lumMod val="75000"/>
+                    <a:lumOff val="25000"/>
+                  </a:schemeClr>
+                </a:solidFill>
+                <a:latin typeface="Work Sans" pitchFamily="2" charset="77"/>
+              </a:rPr>
+              <a:t>Modelado MER</a:t>
+            </a:r>
+          </a:p>
+        </p:txBody>
+      </p:sp>
+      <p:pic>
+        <p:nvPicPr>
+          <p:cNvPr id="4" name="Imagen 3">
+            <a:extLst>
+              <a:ext uri="{FF2B5EF4-FFF2-40B4-BE49-F238E27FC236}">
+                <a16:creationId xmlns:a16="http://schemas.microsoft.com/office/drawing/2014/main" id="{0CB229EB-D5D9-B9AA-67D9-AAE942F31452}"/>
+              </a:ext>
+            </a:extLst>
+          </p:cNvPr>
+          <p:cNvPicPr>
+            <a:picLocks noChangeAspect="1"/>
+          </p:cNvPicPr>
+          <p:nvPr/>
+        </p:nvPicPr>
+        <p:blipFill>
+          <a:blip r:embed="rId2"/>
+          <a:stretch>
+            <a:fillRect/>
+          </a:stretch>
+        </p:blipFill>
+        <p:spPr>
+          <a:xfrm>
+            <a:off x="1273596" y="680525"/>
+            <a:ext cx="9800804" cy="5954182"/>
+          </a:xfrm>
+          <a:prstGeom prst="rect">
+            <a:avLst/>
+          </a:prstGeom>
+        </p:spPr>
+      </p:pic>
+    </p:spTree>
+    <p:extLst>
+      <p:ext uri="{BB962C8B-B14F-4D97-AF65-F5344CB8AC3E}">
+        <p14:creationId xmlns:p14="http://schemas.microsoft.com/office/powerpoint/2010/main" val="1510882134"/>
+      </p:ext>
+    </p:extLst>
+  </p:cSld>
+  <p:clrMapOvr>
+    <a:masterClrMapping/>
+  </p:clrMapOvr>
+</p:sld>
+</file>
+
 <file path=ppt/slides/slide25.xml><?xml version="1.0" encoding="utf-8"?>
 <p:sld xmlns:a="http://schemas.openxmlformats.org/drawingml/2006/main" xmlns:r="http://schemas.openxmlformats.org/officeDocument/2006/relationships" xmlns:p="http://schemas.openxmlformats.org/presentationml/2006/main">
   <p:cSld>
@@ -7815,6 +7739,36 @@
           <a:chExt cx="0" cy="0"/>
         </a:xfrm>
       </p:grpSpPr>
+      <p:pic>
+        <p:nvPicPr>
+          <p:cNvPr id="3" name="Imagen 2">
+            <a:extLst>
+              <a:ext uri="{FF2B5EF4-FFF2-40B4-BE49-F238E27FC236}">
+                <a16:creationId xmlns:a16="http://schemas.microsoft.com/office/drawing/2014/main" id="{65A446D2-A0D7-0AC9-1B40-932F5E0C2CE9}"/>
+              </a:ext>
+            </a:extLst>
+          </p:cNvPr>
+          <p:cNvPicPr>
+            <a:picLocks noChangeAspect="1"/>
+          </p:cNvPicPr>
+          <p:nvPr/>
+        </p:nvPicPr>
+        <p:blipFill>
+          <a:blip r:embed="rId2"/>
+          <a:stretch>
+            <a:fillRect/>
+          </a:stretch>
+        </p:blipFill>
+        <p:spPr>
+          <a:xfrm>
+            <a:off x="0" y="0"/>
+            <a:ext cx="5563892" cy="6858000"/>
+          </a:xfrm>
+          <a:prstGeom prst="rect">
+            <a:avLst/>
+          </a:prstGeom>
+        </p:spPr>
+      </p:pic>
       <p:sp>
         <p:nvSpPr>
           <p:cNvPr id="8" name="CuadroTexto 7">
@@ -7829,8 +7783,8 @@
         </p:nvSpPr>
         <p:spPr>
           <a:xfrm>
-            <a:off x="733293" y="146304"/>
-            <a:ext cx="10725414" cy="830997"/>
+            <a:off x="4681685" y="987573"/>
+            <a:ext cx="7106163" cy="830997"/>
           </a:xfrm>
           <a:prstGeom prst="rect">
             <a:avLst/>
@@ -7854,7 +7808,7 @@
                 </a:solidFill>
                 <a:latin typeface="Work Sans" pitchFamily="2" charset="77"/>
               </a:rPr>
-              <a:t>Diccionario de datos</a:t>
+              <a:t>Modelado MR </a:t>
             </a:r>
           </a:p>
         </p:txBody>
@@ -7862,7 +7816,7 @@
     </p:spTree>
     <p:extLst>
       <p:ext uri="{BB962C8B-B14F-4D97-AF65-F5344CB8AC3E}">
-        <p14:creationId xmlns:p14="http://schemas.microsoft.com/office/powerpoint/2010/main" val="836313466"/>
+        <p14:creationId xmlns:p14="http://schemas.microsoft.com/office/powerpoint/2010/main" val="3629332952"/>
       </p:ext>
     </p:extLst>
   </p:cSld>
@@ -7903,7 +7857,7 @@
         </p:nvSpPr>
         <p:spPr>
           <a:xfrm>
-            <a:off x="733293" y="0"/>
+            <a:off x="733293" y="146304"/>
             <a:ext cx="10725414" cy="830997"/>
           </a:xfrm>
           <a:prstGeom prst="rect">
@@ -7928,45 +7882,15 @@
                 </a:solidFill>
                 <a:latin typeface="Work Sans" pitchFamily="2" charset="77"/>
               </a:rPr>
-              <a:t>Modelado MER</a:t>
-            </a:r>
-          </a:p>
-        </p:txBody>
-      </p:sp>
-      <p:pic>
-        <p:nvPicPr>
-          <p:cNvPr id="4" name="Imagen 3">
-            <a:extLst>
-              <a:ext uri="{FF2B5EF4-FFF2-40B4-BE49-F238E27FC236}">
-                <a16:creationId xmlns:a16="http://schemas.microsoft.com/office/drawing/2014/main" id="{0CB229EB-D5D9-B9AA-67D9-AAE942F31452}"/>
-              </a:ext>
-            </a:extLst>
-          </p:cNvPr>
-          <p:cNvPicPr>
-            <a:picLocks noChangeAspect="1"/>
-          </p:cNvPicPr>
-          <p:nvPr/>
-        </p:nvPicPr>
-        <p:blipFill>
-          <a:blip r:embed="rId2"/>
-          <a:stretch>
-            <a:fillRect/>
-          </a:stretch>
-        </p:blipFill>
-        <p:spPr>
-          <a:xfrm>
-            <a:off x="1273596" y="680525"/>
-            <a:ext cx="9800804" cy="5954182"/>
-          </a:xfrm>
-          <a:prstGeom prst="rect">
-            <a:avLst/>
-          </a:prstGeom>
-        </p:spPr>
-      </p:pic>
+              <a:t>Script de la base de datos</a:t>
+            </a:r>
+          </a:p>
+        </p:txBody>
+      </p:sp>
     </p:spTree>
     <p:extLst>
       <p:ext uri="{BB962C8B-B14F-4D97-AF65-F5344CB8AC3E}">
-        <p14:creationId xmlns:p14="http://schemas.microsoft.com/office/powerpoint/2010/main" val="1510882134"/>
+        <p14:creationId xmlns:p14="http://schemas.microsoft.com/office/powerpoint/2010/main" val="2788323128"/>
       </p:ext>
     </p:extLst>
   </p:cSld>
@@ -7993,42 +7917,52 @@
           <a:chExt cx="0" cy="0"/>
         </a:xfrm>
       </p:grpSpPr>
-      <p:pic>
-        <p:nvPicPr>
-          <p:cNvPr id="3" name="Imagen 2">
-            <a:extLst>
-              <a:ext uri="{FF2B5EF4-FFF2-40B4-BE49-F238E27FC236}">
-                <a16:creationId xmlns:a16="http://schemas.microsoft.com/office/drawing/2014/main" id="{65A446D2-A0D7-0AC9-1B40-932F5E0C2CE9}"/>
-              </a:ext>
-            </a:extLst>
-          </p:cNvPr>
-          <p:cNvPicPr>
-            <a:picLocks noChangeAspect="1"/>
-          </p:cNvPicPr>
-          <p:nvPr/>
-        </p:nvPicPr>
-        <p:blipFill>
-          <a:blip r:embed="rId2"/>
-          <a:stretch>
-            <a:fillRect/>
-          </a:stretch>
-        </p:blipFill>
-        <p:spPr>
-          <a:xfrm>
-            <a:off x="0" y="0"/>
-            <a:ext cx="5563892" cy="6858000"/>
-          </a:xfrm>
-          <a:prstGeom prst="rect">
-            <a:avLst/>
-          </a:prstGeom>
-        </p:spPr>
-      </p:pic>
-      <p:sp>
-        <p:nvSpPr>
-          <p:cNvPr id="8" name="CuadroTexto 7">
-            <a:extLst>
-              <a:ext uri="{FF2B5EF4-FFF2-40B4-BE49-F238E27FC236}">
-                <a16:creationId xmlns:a16="http://schemas.microsoft.com/office/drawing/2014/main" id="{ABC283C7-C020-6BE9-CAFE-D9E18BE28B70}"/>
+      <p:sp>
+        <p:nvSpPr>
+          <p:cNvPr id="2" name="Título 1">
+            <a:extLst>
+              <a:ext uri="{FF2B5EF4-FFF2-40B4-BE49-F238E27FC236}">
+                <a16:creationId xmlns:a16="http://schemas.microsoft.com/office/drawing/2014/main" id="{CAC1D880-FC17-3789-2435-5FF7492EABD6}"/>
+              </a:ext>
+            </a:extLst>
+          </p:cNvPr>
+          <p:cNvSpPr>
+            <a:spLocks noGrp="1"/>
+          </p:cNvSpPr>
+          <p:nvPr>
+            <p:ph type="title"/>
+          </p:nvPr>
+        </p:nvSpPr>
+        <p:spPr>
+          <a:xfrm>
+            <a:off x="456236" y="110481"/>
+            <a:ext cx="10515600" cy="1325563"/>
+          </a:xfrm>
+        </p:spPr>
+        <p:txBody>
+          <a:bodyPr>
+            <a:normAutofit/>
+          </a:bodyPr>
+          <a:lstStyle/>
+          <a:p>
+            <a:r>
+              <a:rPr lang="es-CO" sz="4800" dirty="0">
+                <a:solidFill>
+                  <a:schemeClr val="bg1"/>
+                </a:solidFill>
+                <a:latin typeface="Work Sans" pitchFamily="2" charset="0"/>
+              </a:rPr>
+              <a:t>Conclusiones</a:t>
+            </a:r>
+          </a:p>
+        </p:txBody>
+      </p:sp>
+      <p:sp>
+        <p:nvSpPr>
+          <p:cNvPr id="6" name="CuadroTexto 5">
+            <a:extLst>
+              <a:ext uri="{FF2B5EF4-FFF2-40B4-BE49-F238E27FC236}">
+                <a16:creationId xmlns:a16="http://schemas.microsoft.com/office/drawing/2014/main" id="{2F3F2856-AF7E-FAD7-920C-693A70780A64}"/>
               </a:ext>
             </a:extLst>
           </p:cNvPr>
@@ -8037,8 +7971,8 @@
         </p:nvSpPr>
         <p:spPr>
           <a:xfrm>
-            <a:off x="4681685" y="987573"/>
-            <a:ext cx="7106163" cy="830997"/>
+            <a:off x="181106" y="2112642"/>
+            <a:ext cx="11462254" cy="3170099"/>
           </a:xfrm>
           <a:prstGeom prst="rect">
             <a:avLst/>
@@ -8051,18 +7985,79 @@
           </a:bodyPr>
           <a:lstStyle/>
           <a:p>
-            <a:pPr algn="ctr"/>
-            <a:r>
-              <a:rPr lang="es-ES" sz="4800" dirty="0">
+            <a:pPr algn="just" defTabSz="1257621" hangingPunct="0"/>
+            <a:r>
+              <a:rPr lang="es-ES" sz="2000" dirty="0">
                 <a:solidFill>
-                  <a:schemeClr val="tx1">
-                    <a:lumMod val="75000"/>
-                    <a:lumOff val="25000"/>
-                  </a:schemeClr>
+                  <a:srgbClr val="000000"/>
                 </a:solidFill>
-                <a:latin typeface="Work Sans" pitchFamily="2" charset="77"/>
-              </a:rPr>
-              <a:t>Modelado MR </a:t>
+                <a:effectLst/>
+                <a:latin typeface="Work Sans" pitchFamily="2" charset="0"/>
+              </a:rPr>
+              <a:t>- Tras la documentación mostrada, podemos deducir que los objetivos planteados están dirigidos a solucionar la problemática principal de nuestro proyecto, dado que actualmente no se ve resuelta por completo en el mercado, y de allí se derivan oportunidades para </a:t>
+            </a:r>
+            <a:r>
+              <a:rPr lang="es-ES" sz="2000" dirty="0" err="1">
+                <a:solidFill>
+                  <a:srgbClr val="000000"/>
+                </a:solidFill>
+                <a:effectLst/>
+                <a:latin typeface="Work Sans" pitchFamily="2" charset="0"/>
+              </a:rPr>
+              <a:t>Service</a:t>
+            </a:r>
+            <a:r>
+              <a:rPr lang="es-ES" sz="2000" dirty="0">
+                <a:solidFill>
+                  <a:srgbClr val="000000"/>
+                </a:solidFill>
+                <a:effectLst/>
+                <a:latin typeface="Work Sans" pitchFamily="2" charset="0"/>
+              </a:rPr>
+              <a:t> </a:t>
+            </a:r>
+            <a:r>
+              <a:rPr lang="es-ES" sz="2000" dirty="0" err="1">
+                <a:solidFill>
+                  <a:srgbClr val="000000"/>
+                </a:solidFill>
+                <a:effectLst/>
+                <a:latin typeface="Work Sans" pitchFamily="2" charset="0"/>
+              </a:rPr>
+              <a:t>Market</a:t>
+            </a:r>
+            <a:r>
+              <a:rPr lang="es-ES" sz="2000" dirty="0">
+                <a:solidFill>
+                  <a:srgbClr val="000000"/>
+                </a:solidFill>
+                <a:effectLst/>
+                <a:latin typeface="Work Sans" pitchFamily="2" charset="0"/>
+              </a:rPr>
+              <a:t>.</a:t>
+            </a:r>
+          </a:p>
+          <a:p>
+            <a:pPr algn="just" defTabSz="1257621" hangingPunct="0"/>
+            <a:endParaRPr lang="es-ES" sz="2000" dirty="0">
+              <a:solidFill>
+                <a:srgbClr val="000000"/>
+              </a:solidFill>
+              <a:effectLst/>
+              <a:latin typeface="Work Sans" pitchFamily="2" charset="0"/>
+            </a:endParaRPr>
+          </a:p>
+          <a:p>
+            <a:pPr algn="just" defTabSz="1257621" hangingPunct="0"/>
+            <a:r>
+              <a:rPr lang="es-ES" sz="2000" dirty="0">
+                <a:solidFill>
+                  <a:srgbClr val="000000"/>
+                </a:solidFill>
+                <a:effectLst/>
+                <a:latin typeface="Work Sans" pitchFamily="2" charset="0"/>
+              </a:rPr>
+              <a:t>- Según los datos expuestos, podemos concluir que nuestra aplicación web va a ser un canal de comunicación para clientes y prestadores de servicios que estén dispuestos a darse a conocer, generando así mas ganancias, una negociación a una escala mayor y aumentando la credibilidad de aquellos prestadores de servicios que requieran una ayuda.</a:t>
             </a:r>
           </a:p>
         </p:txBody>
@@ -8070,7 +8065,7 @@
     </p:spTree>
     <p:extLst>
       <p:ext uri="{BB962C8B-B14F-4D97-AF65-F5344CB8AC3E}">
-        <p14:creationId xmlns:p14="http://schemas.microsoft.com/office/powerpoint/2010/main" val="3629332952"/>
+        <p14:creationId xmlns:p14="http://schemas.microsoft.com/office/powerpoint/2010/main" val="1022204198"/>
       </p:ext>
     </p:extLst>
   </p:cSld>
@@ -8099,10 +8094,50 @@
       </p:grpSpPr>
       <p:sp>
         <p:nvSpPr>
-          <p:cNvPr id="8" name="CuadroTexto 7">
-            <a:extLst>
-              <a:ext uri="{FF2B5EF4-FFF2-40B4-BE49-F238E27FC236}">
-                <a16:creationId xmlns:a16="http://schemas.microsoft.com/office/drawing/2014/main" id="{ABC283C7-C020-6BE9-CAFE-D9E18BE28B70}"/>
+          <p:cNvPr id="2" name="Título 1">
+            <a:extLst>
+              <a:ext uri="{FF2B5EF4-FFF2-40B4-BE49-F238E27FC236}">
+                <a16:creationId xmlns:a16="http://schemas.microsoft.com/office/drawing/2014/main" id="{CAC1D880-FC17-3789-2435-5FF7492EABD6}"/>
+              </a:ext>
+            </a:extLst>
+          </p:cNvPr>
+          <p:cNvSpPr>
+            <a:spLocks noGrp="1"/>
+          </p:cNvSpPr>
+          <p:nvPr>
+            <p:ph type="title"/>
+          </p:nvPr>
+        </p:nvSpPr>
+        <p:spPr>
+          <a:xfrm>
+            <a:off x="456236" y="110481"/>
+            <a:ext cx="10515600" cy="1325563"/>
+          </a:xfrm>
+        </p:spPr>
+        <p:txBody>
+          <a:bodyPr>
+            <a:normAutofit/>
+          </a:bodyPr>
+          <a:lstStyle/>
+          <a:p>
+            <a:r>
+              <a:rPr lang="es-CO" sz="4800" dirty="0">
+                <a:solidFill>
+                  <a:schemeClr val="bg1"/>
+                </a:solidFill>
+                <a:latin typeface="Work Sans" pitchFamily="2" charset="0"/>
+              </a:rPr>
+              <a:t>Conclusiones</a:t>
+            </a:r>
+          </a:p>
+        </p:txBody>
+      </p:sp>
+      <p:sp>
+        <p:nvSpPr>
+          <p:cNvPr id="6" name="CuadroTexto 5">
+            <a:extLst>
+              <a:ext uri="{FF2B5EF4-FFF2-40B4-BE49-F238E27FC236}">
+                <a16:creationId xmlns:a16="http://schemas.microsoft.com/office/drawing/2014/main" id="{2F3F2856-AF7E-FAD7-920C-693A70780A64}"/>
               </a:ext>
             </a:extLst>
           </p:cNvPr>
@@ -8111,8 +8146,8 @@
         </p:nvSpPr>
         <p:spPr>
           <a:xfrm>
-            <a:off x="733293" y="146304"/>
-            <a:ext cx="10725414" cy="830997"/>
+            <a:off x="181106" y="1685922"/>
+            <a:ext cx="11462254" cy="5324535"/>
           </a:xfrm>
           <a:prstGeom prst="rect">
             <a:avLst/>
@@ -8125,26 +8160,387 @@
           </a:bodyPr>
           <a:lstStyle/>
           <a:p>
-            <a:pPr algn="ctr"/>
-            <a:r>
-              <a:rPr lang="es-ES" sz="4800" dirty="0">
+            <a:pPr algn="just" defTabSz="1257621" hangingPunct="0"/>
+            <a:r>
+              <a:rPr lang="es-ES" sz="2000" dirty="0">
                 <a:solidFill>
-                  <a:schemeClr val="tx1">
-                    <a:lumMod val="75000"/>
-                    <a:lumOff val="25000"/>
-                  </a:schemeClr>
+                  <a:srgbClr val="404040"/>
                 </a:solidFill>
-                <a:latin typeface="Work Sans" pitchFamily="2" charset="77"/>
-              </a:rPr>
-              <a:t>Script de la base de datos</a:t>
-            </a:r>
+                <a:latin typeface="Work Sans" pitchFamily="2" charset="0"/>
+                <a:ea typeface="Helvetica Neue"/>
+                <a:cs typeface="Calibir"/>
+                <a:sym typeface="Helvetica Neue"/>
+                <a:hlinkClick r:id="rId3"/>
+              </a:rPr>
+              <a:t>https://www.ingenioempresa.com/matriz-foda/#Paso_2_Definiendo_amenazas</a:t>
+            </a:r>
+            <a:r>
+              <a:rPr lang="es-ES" sz="2000" dirty="0">
+                <a:solidFill>
+                  <a:srgbClr val="404040"/>
+                </a:solidFill>
+                <a:latin typeface="Work Sans" pitchFamily="2" charset="0"/>
+                <a:ea typeface="Helvetica Neue"/>
+                <a:cs typeface="Calibir"/>
+                <a:sym typeface="Helvetica Neue"/>
+              </a:rPr>
+              <a:t> </a:t>
+            </a:r>
+          </a:p>
+          <a:p>
+            <a:pPr algn="just" defTabSz="1257621" hangingPunct="0"/>
+            <a:r>
+              <a:rPr lang="es-ES" sz="2000" dirty="0">
+                <a:latin typeface="Work Sans" pitchFamily="2" charset="0"/>
+              </a:rPr>
+              <a:t>Betancourt, D. F. (19 de abril de 2018). </a:t>
+            </a:r>
+            <a:r>
+              <a:rPr lang="es-ES" sz="2000" i="1" dirty="0">
+                <a:latin typeface="Work Sans" pitchFamily="2" charset="0"/>
+              </a:rPr>
+              <a:t>Cómo hacer el análisis FODA (matriz FADO) paso a paso</a:t>
+            </a:r>
+            <a:endParaRPr lang="es-ES" sz="2000" dirty="0">
+              <a:latin typeface="Work Sans" pitchFamily="2" charset="0"/>
+              <a:ea typeface="Helvetica Neue"/>
+              <a:cs typeface="Calibir"/>
+              <a:sym typeface="Helvetica Neue"/>
+            </a:endParaRPr>
+          </a:p>
+          <a:p>
+            <a:pPr algn="just" defTabSz="1257621" hangingPunct="0"/>
+            <a:r>
+              <a:rPr lang="es-ES" sz="2000" dirty="0">
+                <a:solidFill>
+                  <a:srgbClr val="404040"/>
+                </a:solidFill>
+                <a:latin typeface="Work Sans" pitchFamily="2" charset="0"/>
+                <a:ea typeface="Helvetica Neue"/>
+                <a:cs typeface="Calibir"/>
+                <a:sym typeface="Helvetica Neue"/>
+                <a:hlinkClick r:id="rId4"/>
+              </a:rPr>
+              <a:t>https://www.ingenioempresa.com/arbol-de-objetivos/</a:t>
+            </a:r>
+            <a:endParaRPr lang="es-ES" sz="2000" dirty="0">
+              <a:solidFill>
+                <a:srgbClr val="404040"/>
+              </a:solidFill>
+              <a:latin typeface="Work Sans" pitchFamily="2" charset="0"/>
+              <a:ea typeface="Helvetica Neue"/>
+              <a:cs typeface="Calibir"/>
+              <a:sym typeface="Helvetica Neue"/>
+            </a:endParaRPr>
+          </a:p>
+          <a:p>
+            <a:pPr algn="just" defTabSz="1257621" hangingPunct="0"/>
+            <a:r>
+              <a:rPr lang="es-ES" sz="2000" dirty="0">
+                <a:latin typeface="Work Sans" pitchFamily="2" charset="0"/>
+              </a:rPr>
+              <a:t>BETANCOURT, Diego. </a:t>
+            </a:r>
+            <a:r>
+              <a:rPr lang="es-ES" sz="2000" i="1" dirty="0">
+                <a:latin typeface="Work Sans" pitchFamily="2" charset="0"/>
+              </a:rPr>
+              <a:t>Cómo hacer un árbol de objetivos(09 de AGOSTO de 2016)</a:t>
+            </a:r>
+            <a:endParaRPr lang="es-ES" sz="2000" dirty="0">
+              <a:latin typeface="Work Sans" pitchFamily="2" charset="0"/>
+              <a:ea typeface="Helvetica Neue"/>
+              <a:cs typeface="Calibir"/>
+              <a:sym typeface="Helvetica Neue"/>
+            </a:endParaRPr>
+          </a:p>
+          <a:p>
+            <a:pPr algn="just" defTabSz="1257621" hangingPunct="0"/>
+            <a:r>
+              <a:rPr lang="es-ES" sz="2000" dirty="0">
+                <a:solidFill>
+                  <a:srgbClr val="404040"/>
+                </a:solidFill>
+                <a:latin typeface="Work Sans" pitchFamily="2" charset="0"/>
+                <a:ea typeface="Helvetica Neue"/>
+                <a:cs typeface="Calibir"/>
+                <a:sym typeface="Helvetica Neue"/>
+                <a:hlinkClick r:id="rId5"/>
+              </a:rPr>
+              <a:t>https://www.ingenioempresa.com/arbol-de-problemas/</a:t>
+            </a:r>
+            <a:endParaRPr lang="es-ES" sz="2000" dirty="0">
+              <a:solidFill>
+                <a:srgbClr val="404040"/>
+              </a:solidFill>
+              <a:latin typeface="Work Sans" pitchFamily="2" charset="0"/>
+              <a:ea typeface="Helvetica Neue"/>
+              <a:cs typeface="Calibir"/>
+              <a:sym typeface="Helvetica Neue"/>
+            </a:endParaRPr>
+          </a:p>
+          <a:p>
+            <a:pPr algn="just" defTabSz="1257621" hangingPunct="0"/>
+            <a:r>
+              <a:rPr lang="es-ES" sz="2000" dirty="0">
+                <a:latin typeface="Work Sans" pitchFamily="2" charset="0"/>
+              </a:rPr>
+              <a:t>Betancourt, D. F. (05 de julio de 2016). </a:t>
+            </a:r>
+            <a:r>
+              <a:rPr lang="es-ES" sz="2000" i="1" dirty="0">
+                <a:latin typeface="Work Sans" pitchFamily="2" charset="0"/>
+              </a:rPr>
+              <a:t>Cómo hacer un árbol de problemas:</a:t>
+            </a:r>
+            <a:endParaRPr lang="es-ES" sz="2000" dirty="0">
+              <a:latin typeface="Work Sans" pitchFamily="2" charset="0"/>
+              <a:ea typeface="Helvetica Neue"/>
+              <a:cs typeface="Calibir"/>
+              <a:sym typeface="Helvetica Neue"/>
+            </a:endParaRPr>
+          </a:p>
+          <a:p>
+            <a:pPr algn="just" defTabSz="1257621" hangingPunct="0"/>
+            <a:r>
+              <a:rPr lang="es-ES" sz="2000" dirty="0">
+                <a:solidFill>
+                  <a:srgbClr val="404040"/>
+                </a:solidFill>
+                <a:latin typeface="Work Sans" pitchFamily="2" charset="0"/>
+                <a:ea typeface="Helvetica Neue"/>
+                <a:cs typeface="Calibir"/>
+                <a:sym typeface="Helvetica Neue"/>
+                <a:hlinkClick r:id="rId6"/>
+              </a:rPr>
+              <a:t>https://www.ejemplos.co/verbos-para-objetivos-generales-y-especificos/</a:t>
+            </a:r>
+            <a:endParaRPr lang="es-ES" sz="2000" dirty="0">
+              <a:solidFill>
+                <a:srgbClr val="404040"/>
+              </a:solidFill>
+              <a:latin typeface="Work Sans" pitchFamily="2" charset="0"/>
+              <a:ea typeface="Helvetica Neue"/>
+              <a:cs typeface="Calibir"/>
+              <a:sym typeface="Helvetica Neue"/>
+            </a:endParaRPr>
+          </a:p>
+          <a:p>
+            <a:pPr algn="just" defTabSz="1257621" hangingPunct="0"/>
+            <a:r>
+              <a:rPr lang="es-ES" sz="2000" dirty="0">
+                <a:latin typeface="Work Sans" pitchFamily="2" charset="0"/>
+              </a:rPr>
+              <a:t>Enciclopedia de Ejemplos (2022). "Verbos para Objetivos Generales y Específicos". </a:t>
+            </a:r>
+            <a:endParaRPr lang="es-ES" sz="2000" dirty="0">
+              <a:latin typeface="Work Sans" pitchFamily="2" charset="0"/>
+              <a:ea typeface="Helvetica Neue"/>
+              <a:cs typeface="Calibir"/>
+              <a:sym typeface="Helvetica Neue"/>
+            </a:endParaRPr>
+          </a:p>
+          <a:p>
+            <a:pPr algn="just" defTabSz="1257621" hangingPunct="0"/>
+            <a:r>
+              <a:rPr lang="es-ES" sz="2000" dirty="0">
+                <a:solidFill>
+                  <a:srgbClr val="404040"/>
+                </a:solidFill>
+                <a:latin typeface="Work Sans" pitchFamily="2" charset="0"/>
+                <a:ea typeface="Helvetica Neue"/>
+                <a:cs typeface="Calibir"/>
+                <a:sym typeface="Helvetica Neue"/>
+                <a:hlinkClick r:id="rId7"/>
+              </a:rPr>
+              <a:t>https://neetwork.com/wp-content/uploads/2019/10/que-es-la-negociacion.jpg</a:t>
+            </a:r>
+            <a:r>
+              <a:rPr lang="es-ES" sz="2000" dirty="0">
+                <a:solidFill>
+                  <a:srgbClr val="404040"/>
+                </a:solidFill>
+                <a:latin typeface="Work Sans" pitchFamily="2" charset="0"/>
+                <a:ea typeface="Helvetica Neue"/>
+                <a:cs typeface="Calibir"/>
+                <a:sym typeface="Helvetica Neue"/>
+              </a:rPr>
+              <a:t> </a:t>
+            </a:r>
+            <a:r>
+              <a:rPr lang="es-ES" sz="2000" dirty="0">
+                <a:latin typeface="Work Sans" pitchFamily="2" charset="0"/>
+                <a:ea typeface="Helvetica Neue"/>
+                <a:cs typeface="Calibir"/>
+                <a:sym typeface="Helvetica Neue"/>
+              </a:rPr>
+              <a:t>(Imagen referente)</a:t>
+            </a:r>
+          </a:p>
+          <a:p>
+            <a:pPr algn="just" defTabSz="1257621" hangingPunct="0"/>
+            <a:r>
+              <a:rPr lang="es-ES" sz="2000" dirty="0">
+                <a:solidFill>
+                  <a:srgbClr val="404040"/>
+                </a:solidFill>
+                <a:latin typeface="Work Sans" pitchFamily="2" charset="0"/>
+                <a:ea typeface="Helvetica Neue"/>
+                <a:cs typeface="Calibir"/>
+                <a:sym typeface="Helvetica Neue"/>
+                <a:hlinkClick r:id="rId8"/>
+              </a:rPr>
+              <a:t>https://www.protopie.io/</a:t>
+            </a:r>
+            <a:r>
+              <a:rPr lang="es-ES" sz="2000" dirty="0">
+                <a:solidFill>
+                  <a:srgbClr val="404040"/>
+                </a:solidFill>
+                <a:latin typeface="Work Sans" pitchFamily="2" charset="0"/>
+                <a:ea typeface="Helvetica Neue"/>
+                <a:cs typeface="Calibir"/>
+                <a:sym typeface="Helvetica Neue"/>
+              </a:rPr>
+              <a:t> </a:t>
+            </a:r>
+            <a:r>
+              <a:rPr lang="es-ES" sz="2000" dirty="0">
+                <a:latin typeface="Work Sans" pitchFamily="2" charset="0"/>
+                <a:ea typeface="Helvetica Neue"/>
+                <a:cs typeface="Calibir"/>
+                <a:sym typeface="Helvetica Neue"/>
+              </a:rPr>
+              <a:t>(Plataforma interactiva de wireframe)</a:t>
+            </a:r>
+          </a:p>
+          <a:p>
+            <a:pPr algn="just" defTabSz="1257621" hangingPunct="0"/>
+            <a:r>
+              <a:rPr lang="es-ES" sz="2000" dirty="0">
+                <a:solidFill>
+                  <a:srgbClr val="404040"/>
+                </a:solidFill>
+                <a:latin typeface="Work Sans" pitchFamily="2" charset="0"/>
+                <a:ea typeface="Helvetica Neue"/>
+                <a:cs typeface="Calibir"/>
+                <a:sym typeface="Helvetica Neue"/>
+                <a:hlinkClick r:id="rId9"/>
+              </a:rPr>
+              <a:t>https://www.flaticon.es/?k=1629421547935</a:t>
+            </a:r>
+            <a:r>
+              <a:rPr lang="es-ES" sz="2000" dirty="0">
+                <a:solidFill>
+                  <a:srgbClr val="404040"/>
+                </a:solidFill>
+                <a:latin typeface="Work Sans" pitchFamily="2" charset="0"/>
+                <a:ea typeface="Helvetica Neue"/>
+                <a:cs typeface="Calibir"/>
+                <a:sym typeface="Helvetica Neue"/>
+              </a:rPr>
+              <a:t> </a:t>
+            </a:r>
+            <a:r>
+              <a:rPr lang="es-ES" sz="2000" dirty="0">
+                <a:latin typeface="Work Sans" pitchFamily="2" charset="0"/>
+                <a:ea typeface="Helvetica Neue"/>
+                <a:cs typeface="Calibir"/>
+                <a:sym typeface="Helvetica Neue"/>
+              </a:rPr>
+              <a:t>(Iconos)</a:t>
+            </a:r>
+          </a:p>
+          <a:p>
+            <a:pPr algn="just" defTabSz="1257621" hangingPunct="0"/>
+            <a:r>
+              <a:rPr lang="es-ES" sz="2000" dirty="0">
+                <a:solidFill>
+                  <a:srgbClr val="404040"/>
+                </a:solidFill>
+                <a:latin typeface="Work Sans" pitchFamily="2" charset="0"/>
+                <a:ea typeface="Helvetica Neue"/>
+                <a:cs typeface="Calibir"/>
+                <a:sym typeface="Helvetica Neue"/>
+                <a:hlinkClick r:id="rId10"/>
+              </a:rPr>
+              <a:t>https://studio.tailorbrands.com/</a:t>
+            </a:r>
+            <a:r>
+              <a:rPr lang="es-ES" sz="2000" dirty="0">
+                <a:solidFill>
+                  <a:srgbClr val="404040"/>
+                </a:solidFill>
+                <a:latin typeface="Work Sans" pitchFamily="2" charset="0"/>
+                <a:ea typeface="Helvetica Neue"/>
+                <a:cs typeface="Calibir"/>
+                <a:sym typeface="Helvetica Neue"/>
+              </a:rPr>
+              <a:t> </a:t>
+            </a:r>
+            <a:r>
+              <a:rPr lang="es-ES" sz="2000" dirty="0">
+                <a:latin typeface="Work Sans" pitchFamily="2" charset="0"/>
+                <a:ea typeface="Helvetica Neue"/>
+                <a:cs typeface="Calibir"/>
+                <a:sym typeface="Helvetica Neue"/>
+              </a:rPr>
+              <a:t>(Diseño de Logo)</a:t>
+            </a:r>
+          </a:p>
+          <a:p>
+            <a:pPr algn="just" defTabSz="1257621" hangingPunct="0"/>
+            <a:r>
+              <a:rPr lang="es-ES" sz="2000" dirty="0">
+                <a:solidFill>
+                  <a:srgbClr val="404040"/>
+                </a:solidFill>
+                <a:latin typeface="Work Sans" pitchFamily="2" charset="0"/>
+                <a:ea typeface="Helvetica Neue"/>
+                <a:cs typeface="Calibir"/>
+                <a:sym typeface="Helvetica Neue"/>
+                <a:hlinkClick r:id="rId11"/>
+              </a:rPr>
+              <a:t>https://www.ingenioempresa.com/mapa-de-empatia/</a:t>
+            </a:r>
+            <a:r>
+              <a:rPr lang="es-ES" sz="2000" dirty="0">
+                <a:solidFill>
+                  <a:srgbClr val="404040"/>
+                </a:solidFill>
+                <a:latin typeface="Work Sans" pitchFamily="2" charset="0"/>
+                <a:ea typeface="Helvetica Neue"/>
+                <a:cs typeface="Calibir"/>
+                <a:sym typeface="Helvetica Neue"/>
+              </a:rPr>
+              <a:t> </a:t>
+            </a:r>
+            <a:r>
+              <a:rPr lang="es-ES" sz="2000" dirty="0">
+                <a:latin typeface="Work Sans" pitchFamily="2" charset="0"/>
+                <a:ea typeface="Helvetica Neue"/>
+                <a:cs typeface="Calibir"/>
+                <a:sym typeface="Helvetica Neue"/>
+              </a:rPr>
+              <a:t>Ingenio Empresa. “Mapa de empatía”</a:t>
+            </a:r>
+          </a:p>
+          <a:p>
+            <a:pPr algn="just" defTabSz="1257621" hangingPunct="0"/>
+            <a:endParaRPr lang="es-ES" sz="2000" dirty="0">
+              <a:solidFill>
+                <a:srgbClr val="000000"/>
+              </a:solidFill>
+              <a:effectLst/>
+              <a:latin typeface="Work Sans" pitchFamily="2" charset="0"/>
+            </a:endParaRPr>
           </a:p>
         </p:txBody>
       </p:sp>
     </p:spTree>
     <p:extLst>
       <p:ext uri="{BB962C8B-B14F-4D97-AF65-F5344CB8AC3E}">
-        <p14:creationId xmlns:p14="http://schemas.microsoft.com/office/powerpoint/2010/main" val="2788323128"/>
+        <p14:creationId xmlns:p14="http://schemas.microsoft.com/office/powerpoint/2010/main" val="215805229"/>
       </p:ext>
     </p:extLst>
   </p:cSld>
@@ -8171,155 +8567,46 @@
           <a:chExt cx="0" cy="0"/>
         </a:xfrm>
       </p:grpSpPr>
-      <p:sp>
-        <p:nvSpPr>
-          <p:cNvPr id="2" name="Título 1">
-            <a:extLst>
-              <a:ext uri="{FF2B5EF4-FFF2-40B4-BE49-F238E27FC236}">
-                <a16:creationId xmlns:a16="http://schemas.microsoft.com/office/drawing/2014/main" id="{CAC1D880-FC17-3789-2435-5FF7492EABD6}"/>
-              </a:ext>
-            </a:extLst>
-          </p:cNvPr>
-          <p:cNvSpPr>
-            <a:spLocks noGrp="1"/>
-          </p:cNvSpPr>
-          <p:nvPr>
-            <p:ph type="title"/>
-          </p:nvPr>
-        </p:nvSpPr>
-        <p:spPr>
-          <a:xfrm>
-            <a:off x="456236" y="110481"/>
-            <a:ext cx="10515600" cy="1325563"/>
-          </a:xfrm>
-        </p:spPr>
-        <p:txBody>
-          <a:bodyPr>
-            <a:normAutofit/>
-          </a:bodyPr>
-          <a:lstStyle/>
-          <a:p>
-            <a:r>
-              <a:rPr lang="es-CO" sz="4800" dirty="0">
-                <a:solidFill>
-                  <a:schemeClr val="bg1"/>
-                </a:solidFill>
-                <a:latin typeface="Work Sans" pitchFamily="2" charset="0"/>
-              </a:rPr>
-              <a:t>Conclusiones</a:t>
-            </a:r>
-          </a:p>
-        </p:txBody>
-      </p:sp>
-      <p:sp>
-        <p:nvSpPr>
-          <p:cNvPr id="6" name="CuadroTexto 5">
-            <a:extLst>
-              <a:ext uri="{FF2B5EF4-FFF2-40B4-BE49-F238E27FC236}">
-                <a16:creationId xmlns:a16="http://schemas.microsoft.com/office/drawing/2014/main" id="{2F3F2856-AF7E-FAD7-920C-693A70780A64}"/>
-              </a:ext>
-            </a:extLst>
-          </p:cNvPr>
-          <p:cNvSpPr txBox="1"/>
+      <p:pic>
+        <p:nvPicPr>
+          <p:cNvPr id="4" name="Imagen 3" descr="Imagen que contiene Interfaz de usuario gráfica&#10;&#10;Descripción generada automáticamente">
+            <a:extLst>
+              <a:ext uri="{FF2B5EF4-FFF2-40B4-BE49-F238E27FC236}">
+                <a16:creationId xmlns:a16="http://schemas.microsoft.com/office/drawing/2014/main" id="{A01EB75E-8874-42DD-11A3-2D5CA1D238B7}"/>
+              </a:ext>
+            </a:extLst>
+          </p:cNvPr>
+          <p:cNvPicPr>
+            <a:picLocks noChangeAspect="1"/>
+          </p:cNvPicPr>
           <p:nvPr/>
-        </p:nvSpPr>
-        <p:spPr>
-          <a:xfrm>
-            <a:off x="181106" y="2112642"/>
-            <a:ext cx="11462254" cy="3170099"/>
+        </p:nvPicPr>
+        <p:blipFill>
+          <a:blip r:embed="rId2" cstate="email">
+            <a:extLst>
+              <a:ext uri="{28A0092B-C50C-407E-A947-70E740481C1C}">
+                <a14:useLocalDpi xmlns:a14="http://schemas.microsoft.com/office/drawing/2010/main"/>
+              </a:ext>
+            </a:extLst>
+          </a:blip>
+          <a:stretch>
+            <a:fillRect/>
+          </a:stretch>
+        </p:blipFill>
+        <p:spPr>
+          <a:xfrm>
+            <a:off x="0" y="0"/>
+            <a:ext cx="12192000" cy="6858000"/>
           </a:xfrm>
           <a:prstGeom prst="rect">
             <a:avLst/>
           </a:prstGeom>
-          <a:noFill/>
-        </p:spPr>
-        <p:txBody>
-          <a:bodyPr wrap="square" rtlCol="0">
-            <a:spAutoFit/>
-          </a:bodyPr>
-          <a:lstStyle/>
-          <a:p>
-            <a:pPr algn="just" defTabSz="1257621" hangingPunct="0"/>
-            <a:r>
-              <a:rPr lang="es-ES" sz="2000" dirty="0">
-                <a:solidFill>
-                  <a:srgbClr val="000000"/>
-                </a:solidFill>
-                <a:effectLst/>
-                <a:latin typeface="Work Sans" pitchFamily="2" charset="0"/>
-              </a:rPr>
-              <a:t>- Tras la documentación mostrada, podemos deducir que los objetivos planteados están dirigidos a solucionar la problemática principal de nuestro proyecto, dado que actualmente no se ve resuelta por completo en el mercado, y de allí se derivan oportunidades para </a:t>
-            </a:r>
-            <a:r>
-              <a:rPr lang="es-ES" sz="2000" dirty="0" err="1">
-                <a:solidFill>
-                  <a:srgbClr val="000000"/>
-                </a:solidFill>
-                <a:effectLst/>
-                <a:latin typeface="Work Sans" pitchFamily="2" charset="0"/>
-              </a:rPr>
-              <a:t>Service</a:t>
-            </a:r>
-            <a:r>
-              <a:rPr lang="es-ES" sz="2000" dirty="0">
-                <a:solidFill>
-                  <a:srgbClr val="000000"/>
-                </a:solidFill>
-                <a:effectLst/>
-                <a:latin typeface="Work Sans" pitchFamily="2" charset="0"/>
-              </a:rPr>
-              <a:t> </a:t>
-            </a:r>
-            <a:r>
-              <a:rPr lang="es-ES" sz="2000" dirty="0" err="1">
-                <a:solidFill>
-                  <a:srgbClr val="000000"/>
-                </a:solidFill>
-                <a:effectLst/>
-                <a:latin typeface="Work Sans" pitchFamily="2" charset="0"/>
-              </a:rPr>
-              <a:t>Market</a:t>
-            </a:r>
-            <a:r>
-              <a:rPr lang="es-ES" sz="2000" dirty="0">
-                <a:solidFill>
-                  <a:srgbClr val="000000"/>
-                </a:solidFill>
-                <a:effectLst/>
-                <a:latin typeface="Work Sans" pitchFamily="2" charset="0"/>
-              </a:rPr>
-              <a:t>.</a:t>
-            </a:r>
-          </a:p>
-          <a:p>
-            <a:pPr algn="just" defTabSz="1257621" hangingPunct="0"/>
-            <a:endParaRPr lang="es-ES" sz="2000" dirty="0">
-              <a:solidFill>
-                <a:srgbClr val="000000"/>
-              </a:solidFill>
-              <a:effectLst/>
-              <a:latin typeface="Work Sans" pitchFamily="2" charset="0"/>
-            </a:endParaRPr>
-          </a:p>
-          <a:p>
-            <a:pPr algn="just" defTabSz="1257621" hangingPunct="0"/>
-            <a:r>
-              <a:rPr lang="es-ES" sz="2000" dirty="0">
-                <a:solidFill>
-                  <a:srgbClr val="000000"/>
-                </a:solidFill>
-                <a:effectLst/>
-                <a:latin typeface="Work Sans" pitchFamily="2" charset="0"/>
-              </a:rPr>
-              <a:t>- Según los datos expuestos, podemos concluir que nuestra aplicación web va a ser un canal de comunicación para clientes y prestadores de servicios que estén dispuestos a darse a conocer, generando así mas ganancias, una negociación a una escala mayor y aumentando la credibilidad de aquellos prestadores de servicios que requieran una ayuda.</a:t>
-            </a:r>
-          </a:p>
-        </p:txBody>
-      </p:sp>
+        </p:spPr>
+      </p:pic>
     </p:spTree>
     <p:extLst>
       <p:ext uri="{BB962C8B-B14F-4D97-AF65-F5344CB8AC3E}">
-        <p14:creationId xmlns:p14="http://schemas.microsoft.com/office/powerpoint/2010/main" val="1022204198"/>
+        <p14:creationId xmlns:p14="http://schemas.microsoft.com/office/powerpoint/2010/main" val="2776220320"/>
       </p:ext>
     </p:extLst>
   </p:cSld>
@@ -8526,547 +8813,6 @@
     <p:extLst>
       <p:ext uri="{BB962C8B-B14F-4D97-AF65-F5344CB8AC3E}">
         <p14:creationId xmlns:p14="http://schemas.microsoft.com/office/powerpoint/2010/main" val="1500403096"/>
-      </p:ext>
-    </p:extLst>
-  </p:cSld>
-  <p:clrMapOvr>
-    <a:masterClrMapping/>
-  </p:clrMapOvr>
-</p:sld>
-</file>
-
-<file path=ppt/slides/slide30.xml><?xml version="1.0" encoding="utf-8"?>
-<p:sld xmlns:a="http://schemas.openxmlformats.org/drawingml/2006/main" xmlns:r="http://schemas.openxmlformats.org/officeDocument/2006/relationships" xmlns:p="http://schemas.openxmlformats.org/presentationml/2006/main">
-  <p:cSld>
-    <p:spTree>
-      <p:nvGrpSpPr>
-        <p:cNvPr id="1" name=""/>
-        <p:cNvGrpSpPr/>
-        <p:nvPr/>
-      </p:nvGrpSpPr>
-      <p:grpSpPr>
-        <a:xfrm>
-          <a:off x="0" y="0"/>
-          <a:ext cx="0" cy="0"/>
-          <a:chOff x="0" y="0"/>
-          <a:chExt cx="0" cy="0"/>
-        </a:xfrm>
-      </p:grpSpPr>
-      <p:sp>
-        <p:nvSpPr>
-          <p:cNvPr id="2" name="Título 1">
-            <a:extLst>
-              <a:ext uri="{FF2B5EF4-FFF2-40B4-BE49-F238E27FC236}">
-                <a16:creationId xmlns:a16="http://schemas.microsoft.com/office/drawing/2014/main" id="{CAC1D880-FC17-3789-2435-5FF7492EABD6}"/>
-              </a:ext>
-            </a:extLst>
-          </p:cNvPr>
-          <p:cNvSpPr>
-            <a:spLocks noGrp="1"/>
-          </p:cNvSpPr>
-          <p:nvPr>
-            <p:ph type="title"/>
-          </p:nvPr>
-        </p:nvSpPr>
-        <p:spPr>
-          <a:xfrm>
-            <a:off x="456236" y="110481"/>
-            <a:ext cx="10515600" cy="1325563"/>
-          </a:xfrm>
-        </p:spPr>
-        <p:txBody>
-          <a:bodyPr>
-            <a:normAutofit/>
-          </a:bodyPr>
-          <a:lstStyle/>
-          <a:p>
-            <a:r>
-              <a:rPr lang="es-CO" sz="4800" dirty="0">
-                <a:solidFill>
-                  <a:schemeClr val="bg1"/>
-                </a:solidFill>
-                <a:latin typeface="Work Sans" pitchFamily="2" charset="0"/>
-              </a:rPr>
-              <a:t>Conclusiones</a:t>
-            </a:r>
-          </a:p>
-        </p:txBody>
-      </p:sp>
-      <p:sp>
-        <p:nvSpPr>
-          <p:cNvPr id="6" name="CuadroTexto 5">
-            <a:extLst>
-              <a:ext uri="{FF2B5EF4-FFF2-40B4-BE49-F238E27FC236}">
-                <a16:creationId xmlns:a16="http://schemas.microsoft.com/office/drawing/2014/main" id="{2F3F2856-AF7E-FAD7-920C-693A70780A64}"/>
-              </a:ext>
-            </a:extLst>
-          </p:cNvPr>
-          <p:cNvSpPr txBox="1"/>
-          <p:nvPr/>
-        </p:nvSpPr>
-        <p:spPr>
-          <a:xfrm>
-            <a:off x="181106" y="1685922"/>
-            <a:ext cx="11462254" cy="5324535"/>
-          </a:xfrm>
-          <a:prstGeom prst="rect">
-            <a:avLst/>
-          </a:prstGeom>
-          <a:noFill/>
-        </p:spPr>
-        <p:txBody>
-          <a:bodyPr wrap="square" rtlCol="0">
-            <a:spAutoFit/>
-          </a:bodyPr>
-          <a:lstStyle/>
-          <a:p>
-            <a:pPr algn="just" defTabSz="1257621" hangingPunct="0"/>
-            <a:r>
-              <a:rPr lang="es-ES" sz="2000" dirty="0">
-                <a:solidFill>
-                  <a:srgbClr val="404040"/>
-                </a:solidFill>
-                <a:latin typeface="Work Sans" pitchFamily="2" charset="0"/>
-                <a:ea typeface="Helvetica Neue"/>
-                <a:cs typeface="Calibir"/>
-                <a:sym typeface="Helvetica Neue"/>
-                <a:hlinkClick r:id="rId3"/>
-              </a:rPr>
-              <a:t>https://www.ingenioempresa.com/matriz-foda/#Paso_2_Definiendo_amenazas</a:t>
-            </a:r>
-            <a:r>
-              <a:rPr lang="es-ES" sz="2000" dirty="0">
-                <a:solidFill>
-                  <a:srgbClr val="404040"/>
-                </a:solidFill>
-                <a:latin typeface="Work Sans" pitchFamily="2" charset="0"/>
-                <a:ea typeface="Helvetica Neue"/>
-                <a:cs typeface="Calibir"/>
-                <a:sym typeface="Helvetica Neue"/>
-              </a:rPr>
-              <a:t> </a:t>
-            </a:r>
-          </a:p>
-          <a:p>
-            <a:pPr algn="just" defTabSz="1257621" hangingPunct="0"/>
-            <a:r>
-              <a:rPr lang="es-ES" sz="2000" dirty="0">
-                <a:latin typeface="Work Sans" pitchFamily="2" charset="0"/>
-              </a:rPr>
-              <a:t>Betancourt, D. F. (19 de abril de 2018). </a:t>
-            </a:r>
-            <a:r>
-              <a:rPr lang="es-ES" sz="2000" i="1" dirty="0">
-                <a:latin typeface="Work Sans" pitchFamily="2" charset="0"/>
-              </a:rPr>
-              <a:t>Cómo hacer el análisis FODA (matriz FADO) paso a paso</a:t>
-            </a:r>
-            <a:endParaRPr lang="es-ES" sz="2000" dirty="0">
-              <a:latin typeface="Work Sans" pitchFamily="2" charset="0"/>
-              <a:ea typeface="Helvetica Neue"/>
-              <a:cs typeface="Calibir"/>
-              <a:sym typeface="Helvetica Neue"/>
-            </a:endParaRPr>
-          </a:p>
-          <a:p>
-            <a:pPr algn="just" defTabSz="1257621" hangingPunct="0"/>
-            <a:r>
-              <a:rPr lang="es-ES" sz="2000" dirty="0">
-                <a:solidFill>
-                  <a:srgbClr val="404040"/>
-                </a:solidFill>
-                <a:latin typeface="Work Sans" pitchFamily="2" charset="0"/>
-                <a:ea typeface="Helvetica Neue"/>
-                <a:cs typeface="Calibir"/>
-                <a:sym typeface="Helvetica Neue"/>
-                <a:hlinkClick r:id="rId4"/>
-              </a:rPr>
-              <a:t>https://www.ingenioempresa.com/arbol-de-objetivos/</a:t>
-            </a:r>
-            <a:endParaRPr lang="es-ES" sz="2000" dirty="0">
-              <a:solidFill>
-                <a:srgbClr val="404040"/>
-              </a:solidFill>
-              <a:latin typeface="Work Sans" pitchFamily="2" charset="0"/>
-              <a:ea typeface="Helvetica Neue"/>
-              <a:cs typeface="Calibir"/>
-              <a:sym typeface="Helvetica Neue"/>
-            </a:endParaRPr>
-          </a:p>
-          <a:p>
-            <a:pPr algn="just" defTabSz="1257621" hangingPunct="0"/>
-            <a:r>
-              <a:rPr lang="es-ES" sz="2000" dirty="0">
-                <a:latin typeface="Work Sans" pitchFamily="2" charset="0"/>
-              </a:rPr>
-              <a:t>BETANCOURT, Diego. </a:t>
-            </a:r>
-            <a:r>
-              <a:rPr lang="es-ES" sz="2000" i="1" dirty="0">
-                <a:latin typeface="Work Sans" pitchFamily="2" charset="0"/>
-              </a:rPr>
-              <a:t>Cómo hacer un árbol de objetivos(09 de AGOSTO de 2016)</a:t>
-            </a:r>
-            <a:endParaRPr lang="es-ES" sz="2000" dirty="0">
-              <a:latin typeface="Work Sans" pitchFamily="2" charset="0"/>
-              <a:ea typeface="Helvetica Neue"/>
-              <a:cs typeface="Calibir"/>
-              <a:sym typeface="Helvetica Neue"/>
-            </a:endParaRPr>
-          </a:p>
-          <a:p>
-            <a:pPr algn="just" defTabSz="1257621" hangingPunct="0"/>
-            <a:r>
-              <a:rPr lang="es-ES" sz="2000" dirty="0">
-                <a:solidFill>
-                  <a:srgbClr val="404040"/>
-                </a:solidFill>
-                <a:latin typeface="Work Sans" pitchFamily="2" charset="0"/>
-                <a:ea typeface="Helvetica Neue"/>
-                <a:cs typeface="Calibir"/>
-                <a:sym typeface="Helvetica Neue"/>
-                <a:hlinkClick r:id="rId5"/>
-              </a:rPr>
-              <a:t>https://www.ingenioempresa.com/arbol-de-problemas/</a:t>
-            </a:r>
-            <a:endParaRPr lang="es-ES" sz="2000" dirty="0">
-              <a:solidFill>
-                <a:srgbClr val="404040"/>
-              </a:solidFill>
-              <a:latin typeface="Work Sans" pitchFamily="2" charset="0"/>
-              <a:ea typeface="Helvetica Neue"/>
-              <a:cs typeface="Calibir"/>
-              <a:sym typeface="Helvetica Neue"/>
-            </a:endParaRPr>
-          </a:p>
-          <a:p>
-            <a:pPr algn="just" defTabSz="1257621" hangingPunct="0"/>
-            <a:r>
-              <a:rPr lang="es-ES" sz="2000" dirty="0">
-                <a:latin typeface="Work Sans" pitchFamily="2" charset="0"/>
-              </a:rPr>
-              <a:t>Betancourt, D. F. (05 de julio de 2016). </a:t>
-            </a:r>
-            <a:r>
-              <a:rPr lang="es-ES" sz="2000" i="1" dirty="0">
-                <a:latin typeface="Work Sans" pitchFamily="2" charset="0"/>
-              </a:rPr>
-              <a:t>Cómo hacer un árbol de problemas:</a:t>
-            </a:r>
-            <a:endParaRPr lang="es-ES" sz="2000" dirty="0">
-              <a:latin typeface="Work Sans" pitchFamily="2" charset="0"/>
-              <a:ea typeface="Helvetica Neue"/>
-              <a:cs typeface="Calibir"/>
-              <a:sym typeface="Helvetica Neue"/>
-            </a:endParaRPr>
-          </a:p>
-          <a:p>
-            <a:pPr algn="just" defTabSz="1257621" hangingPunct="0"/>
-            <a:r>
-              <a:rPr lang="es-ES" sz="2000" dirty="0">
-                <a:solidFill>
-                  <a:srgbClr val="404040"/>
-                </a:solidFill>
-                <a:latin typeface="Work Sans" pitchFamily="2" charset="0"/>
-                <a:ea typeface="Helvetica Neue"/>
-                <a:cs typeface="Calibir"/>
-                <a:sym typeface="Helvetica Neue"/>
-                <a:hlinkClick r:id="rId6"/>
-              </a:rPr>
-              <a:t>https://www.ejemplos.co/verbos-para-objetivos-generales-y-especificos/</a:t>
-            </a:r>
-            <a:endParaRPr lang="es-ES" sz="2000" dirty="0">
-              <a:solidFill>
-                <a:srgbClr val="404040"/>
-              </a:solidFill>
-              <a:latin typeface="Work Sans" pitchFamily="2" charset="0"/>
-              <a:ea typeface="Helvetica Neue"/>
-              <a:cs typeface="Calibir"/>
-              <a:sym typeface="Helvetica Neue"/>
-            </a:endParaRPr>
-          </a:p>
-          <a:p>
-            <a:pPr algn="just" defTabSz="1257621" hangingPunct="0"/>
-            <a:r>
-              <a:rPr lang="es-ES" sz="2000" dirty="0">
-                <a:latin typeface="Work Sans" pitchFamily="2" charset="0"/>
-              </a:rPr>
-              <a:t>Enciclopedia de Ejemplos (2022). "Verbos para Objetivos Generales y Específicos". </a:t>
-            </a:r>
-            <a:endParaRPr lang="es-ES" sz="2000" dirty="0">
-              <a:latin typeface="Work Sans" pitchFamily="2" charset="0"/>
-              <a:ea typeface="Helvetica Neue"/>
-              <a:cs typeface="Calibir"/>
-              <a:sym typeface="Helvetica Neue"/>
-            </a:endParaRPr>
-          </a:p>
-          <a:p>
-            <a:pPr algn="just" defTabSz="1257621" hangingPunct="0"/>
-            <a:r>
-              <a:rPr lang="es-ES" sz="2000" dirty="0">
-                <a:solidFill>
-                  <a:srgbClr val="404040"/>
-                </a:solidFill>
-                <a:latin typeface="Work Sans" pitchFamily="2" charset="0"/>
-                <a:ea typeface="Helvetica Neue"/>
-                <a:cs typeface="Calibir"/>
-                <a:sym typeface="Helvetica Neue"/>
-                <a:hlinkClick r:id="rId7"/>
-              </a:rPr>
-              <a:t>https://neetwork.com/wp-content/uploads/2019/10/que-es-la-negociacion.jpg</a:t>
-            </a:r>
-            <a:r>
-              <a:rPr lang="es-ES" sz="2000" dirty="0">
-                <a:solidFill>
-                  <a:srgbClr val="404040"/>
-                </a:solidFill>
-                <a:latin typeface="Work Sans" pitchFamily="2" charset="0"/>
-                <a:ea typeface="Helvetica Neue"/>
-                <a:cs typeface="Calibir"/>
-                <a:sym typeface="Helvetica Neue"/>
-              </a:rPr>
-              <a:t> </a:t>
-            </a:r>
-            <a:r>
-              <a:rPr lang="es-ES" sz="2000" dirty="0">
-                <a:latin typeface="Work Sans" pitchFamily="2" charset="0"/>
-                <a:ea typeface="Helvetica Neue"/>
-                <a:cs typeface="Calibir"/>
-                <a:sym typeface="Helvetica Neue"/>
-              </a:rPr>
-              <a:t>(Imagen referente)</a:t>
-            </a:r>
-          </a:p>
-          <a:p>
-            <a:pPr algn="just" defTabSz="1257621" hangingPunct="0"/>
-            <a:r>
-              <a:rPr lang="es-ES" sz="2000" dirty="0">
-                <a:solidFill>
-                  <a:srgbClr val="404040"/>
-                </a:solidFill>
-                <a:latin typeface="Work Sans" pitchFamily="2" charset="0"/>
-                <a:ea typeface="Helvetica Neue"/>
-                <a:cs typeface="Calibir"/>
-                <a:sym typeface="Helvetica Neue"/>
-                <a:hlinkClick r:id="rId8"/>
-              </a:rPr>
-              <a:t>https://www.protopie.io/</a:t>
-            </a:r>
-            <a:r>
-              <a:rPr lang="es-ES" sz="2000" dirty="0">
-                <a:solidFill>
-                  <a:srgbClr val="404040"/>
-                </a:solidFill>
-                <a:latin typeface="Work Sans" pitchFamily="2" charset="0"/>
-                <a:ea typeface="Helvetica Neue"/>
-                <a:cs typeface="Calibir"/>
-                <a:sym typeface="Helvetica Neue"/>
-              </a:rPr>
-              <a:t> </a:t>
-            </a:r>
-            <a:r>
-              <a:rPr lang="es-ES" sz="2000" dirty="0">
-                <a:latin typeface="Work Sans" pitchFamily="2" charset="0"/>
-                <a:ea typeface="Helvetica Neue"/>
-                <a:cs typeface="Calibir"/>
-                <a:sym typeface="Helvetica Neue"/>
-              </a:rPr>
-              <a:t>(Plataforma interactiva de wireframe)</a:t>
-            </a:r>
-          </a:p>
-          <a:p>
-            <a:pPr algn="just" defTabSz="1257621" hangingPunct="0"/>
-            <a:r>
-              <a:rPr lang="es-ES" sz="2000" dirty="0">
-                <a:solidFill>
-                  <a:srgbClr val="404040"/>
-                </a:solidFill>
-                <a:latin typeface="Work Sans" pitchFamily="2" charset="0"/>
-                <a:ea typeface="Helvetica Neue"/>
-                <a:cs typeface="Calibir"/>
-                <a:sym typeface="Helvetica Neue"/>
-                <a:hlinkClick r:id="rId9"/>
-              </a:rPr>
-              <a:t>https://www.flaticon.es/?k=1629421547935</a:t>
-            </a:r>
-            <a:r>
-              <a:rPr lang="es-ES" sz="2000" dirty="0">
-                <a:solidFill>
-                  <a:srgbClr val="404040"/>
-                </a:solidFill>
-                <a:latin typeface="Work Sans" pitchFamily="2" charset="0"/>
-                <a:ea typeface="Helvetica Neue"/>
-                <a:cs typeface="Calibir"/>
-                <a:sym typeface="Helvetica Neue"/>
-              </a:rPr>
-              <a:t> </a:t>
-            </a:r>
-            <a:r>
-              <a:rPr lang="es-ES" sz="2000" dirty="0">
-                <a:latin typeface="Work Sans" pitchFamily="2" charset="0"/>
-                <a:ea typeface="Helvetica Neue"/>
-                <a:cs typeface="Calibir"/>
-                <a:sym typeface="Helvetica Neue"/>
-              </a:rPr>
-              <a:t>(Iconos)</a:t>
-            </a:r>
-          </a:p>
-          <a:p>
-            <a:pPr algn="just" defTabSz="1257621" hangingPunct="0"/>
-            <a:r>
-              <a:rPr lang="es-ES" sz="2000" dirty="0">
-                <a:solidFill>
-                  <a:srgbClr val="404040"/>
-                </a:solidFill>
-                <a:latin typeface="Work Sans" pitchFamily="2" charset="0"/>
-                <a:ea typeface="Helvetica Neue"/>
-                <a:cs typeface="Calibir"/>
-                <a:sym typeface="Helvetica Neue"/>
-                <a:hlinkClick r:id="rId10"/>
-              </a:rPr>
-              <a:t>https://studio.tailorbrands.com/</a:t>
-            </a:r>
-            <a:r>
-              <a:rPr lang="es-ES" sz="2000" dirty="0">
-                <a:solidFill>
-                  <a:srgbClr val="404040"/>
-                </a:solidFill>
-                <a:latin typeface="Work Sans" pitchFamily="2" charset="0"/>
-                <a:ea typeface="Helvetica Neue"/>
-                <a:cs typeface="Calibir"/>
-                <a:sym typeface="Helvetica Neue"/>
-              </a:rPr>
-              <a:t> </a:t>
-            </a:r>
-            <a:r>
-              <a:rPr lang="es-ES" sz="2000" dirty="0">
-                <a:latin typeface="Work Sans" pitchFamily="2" charset="0"/>
-                <a:ea typeface="Helvetica Neue"/>
-                <a:cs typeface="Calibir"/>
-                <a:sym typeface="Helvetica Neue"/>
-              </a:rPr>
-              <a:t>(Diseño de Logo)</a:t>
-            </a:r>
-          </a:p>
-          <a:p>
-            <a:pPr algn="just" defTabSz="1257621" hangingPunct="0"/>
-            <a:r>
-              <a:rPr lang="es-ES" sz="2000" dirty="0">
-                <a:solidFill>
-                  <a:srgbClr val="404040"/>
-                </a:solidFill>
-                <a:latin typeface="Work Sans" pitchFamily="2" charset="0"/>
-                <a:ea typeface="Helvetica Neue"/>
-                <a:cs typeface="Calibir"/>
-                <a:sym typeface="Helvetica Neue"/>
-                <a:hlinkClick r:id="rId11"/>
-              </a:rPr>
-              <a:t>https://www.ingenioempresa.com/mapa-de-empatia/</a:t>
-            </a:r>
-            <a:r>
-              <a:rPr lang="es-ES" sz="2000" dirty="0">
-                <a:solidFill>
-                  <a:srgbClr val="404040"/>
-                </a:solidFill>
-                <a:latin typeface="Work Sans" pitchFamily="2" charset="0"/>
-                <a:ea typeface="Helvetica Neue"/>
-                <a:cs typeface="Calibir"/>
-                <a:sym typeface="Helvetica Neue"/>
-              </a:rPr>
-              <a:t> </a:t>
-            </a:r>
-            <a:r>
-              <a:rPr lang="es-ES" sz="2000" dirty="0">
-                <a:latin typeface="Work Sans" pitchFamily="2" charset="0"/>
-                <a:ea typeface="Helvetica Neue"/>
-                <a:cs typeface="Calibir"/>
-                <a:sym typeface="Helvetica Neue"/>
-              </a:rPr>
-              <a:t>Ingenio Empresa. “Mapa de empatía”</a:t>
-            </a:r>
-          </a:p>
-          <a:p>
-            <a:pPr algn="just" defTabSz="1257621" hangingPunct="0"/>
-            <a:endParaRPr lang="es-ES" sz="2000" dirty="0">
-              <a:solidFill>
-                <a:srgbClr val="000000"/>
-              </a:solidFill>
-              <a:effectLst/>
-              <a:latin typeface="Work Sans" pitchFamily="2" charset="0"/>
-            </a:endParaRPr>
-          </a:p>
-        </p:txBody>
-      </p:sp>
-    </p:spTree>
-    <p:extLst>
-      <p:ext uri="{BB962C8B-B14F-4D97-AF65-F5344CB8AC3E}">
-        <p14:creationId xmlns:p14="http://schemas.microsoft.com/office/powerpoint/2010/main" val="215805229"/>
-      </p:ext>
-    </p:extLst>
-  </p:cSld>
-  <p:clrMapOvr>
-    <a:masterClrMapping/>
-  </p:clrMapOvr>
-</p:sld>
-</file>
-
-<file path=ppt/slides/slide31.xml><?xml version="1.0" encoding="utf-8"?>
-<p:sld xmlns:a="http://schemas.openxmlformats.org/drawingml/2006/main" xmlns:r="http://schemas.openxmlformats.org/officeDocument/2006/relationships" xmlns:p="http://schemas.openxmlformats.org/presentationml/2006/main">
-  <p:cSld>
-    <p:spTree>
-      <p:nvGrpSpPr>
-        <p:cNvPr id="1" name=""/>
-        <p:cNvGrpSpPr/>
-        <p:nvPr/>
-      </p:nvGrpSpPr>
-      <p:grpSpPr>
-        <a:xfrm>
-          <a:off x="0" y="0"/>
-          <a:ext cx="0" cy="0"/>
-          <a:chOff x="0" y="0"/>
-          <a:chExt cx="0" cy="0"/>
-        </a:xfrm>
-      </p:grpSpPr>
-      <p:pic>
-        <p:nvPicPr>
-          <p:cNvPr id="4" name="Imagen 3" descr="Imagen que contiene Interfaz de usuario gráfica&#10;&#10;Descripción generada automáticamente">
-            <a:extLst>
-              <a:ext uri="{FF2B5EF4-FFF2-40B4-BE49-F238E27FC236}">
-                <a16:creationId xmlns:a16="http://schemas.microsoft.com/office/drawing/2014/main" id="{A01EB75E-8874-42DD-11A3-2D5CA1D238B7}"/>
-              </a:ext>
-            </a:extLst>
-          </p:cNvPr>
-          <p:cNvPicPr>
-            <a:picLocks noChangeAspect="1"/>
-          </p:cNvPicPr>
-          <p:nvPr/>
-        </p:nvPicPr>
-        <p:blipFill>
-          <a:blip r:embed="rId2" cstate="email">
-            <a:extLst>
-              <a:ext uri="{28A0092B-C50C-407E-A947-70E740481C1C}">
-                <a14:useLocalDpi xmlns:a14="http://schemas.microsoft.com/office/drawing/2010/main"/>
-              </a:ext>
-            </a:extLst>
-          </a:blip>
-          <a:stretch>
-            <a:fillRect/>
-          </a:stretch>
-        </p:blipFill>
-        <p:spPr>
-          <a:xfrm>
-            <a:off x="0" y="0"/>
-            <a:ext cx="12192000" cy="6858000"/>
-          </a:xfrm>
-          <a:prstGeom prst="rect">
-            <a:avLst/>
-          </a:prstGeom>
-        </p:spPr>
-      </p:pic>
-    </p:spTree>
-    <p:extLst>
-      <p:ext uri="{BB962C8B-B14F-4D97-AF65-F5344CB8AC3E}">
-        <p14:creationId xmlns:p14="http://schemas.microsoft.com/office/powerpoint/2010/main" val="2776220320"/>
       </p:ext>
     </p:extLst>
   </p:cSld>

</xml_diff>